<commit_message>
created my own ppt in php
</commit_message>
<xml_diff>
--- a/folders/multi_slide_test.pptx
+++ b/folders/multi_slide_test.pptx
@@ -162,7 +162,7 @@
   </p:cSld>
   <p:clrMap bg1="lt1" tx1="dk1" bg2="lt2" tx2="dk2" accent1="accent1" accent2="accent2" accent3="accent3" accent4="accent4" accent5="accent5" accent6="accent6" hlink="hlink" folHlink="folHlink"/>
   <p:sldLayoutIdLst>
-    <p:sldLayoutId id="2460070882" r:id="rId1"/>
+    <p:sldLayoutId id="2460071029" r:id="rId1"/>
   </p:sldLayoutIdLst>
   <p:txStyles>
     <p:titleStyle>
@@ -282,10 +282,10 @@
       </p:nvGrpSpPr>
       <p:grpSpPr>
         <a:xfrm>
-          <a:off x="1714500" y="952500"/>
-          <a:ext cx="7429500" cy="1905000"/>
-          <a:chOff x="1714500" y="952500"/>
-          <a:chExt cx="7429500" cy="1905000"/>
+          <a:off x="0" y="0"/>
+          <a:ext cx="5715000" cy="952500"/>
+          <a:chOff x="0" y="0"/>
+          <a:chExt cx="5715000" cy="952500"/>
         </a:xfrm>
       </p:grpSpPr>
       <p:sp>
@@ -296,7 +296,7 @@
         </p:nvSpPr>
         <p:spPr>
           <a:xfrm>
-            <a:off x="1714500" y="952500"/>
+            <a:off x="0" y="0"/>
             <a:ext cx="5715000" cy="952500"/>
           </a:xfrm>
           <a:prstGeom prst="rect">
@@ -344,9 +344,9 @@
 </file>
 
 <file path=ppt/theme/theme1.xml><?xml version="1.0" encoding="utf-8"?>
-<a:theme xmlns:a="http://schemas.openxmlformats.org/drawingml/2006/main" name="Theme69">
+<a:theme xmlns:a="http://schemas.openxmlformats.org/drawingml/2006/main" name="Theme97">
   <a:themeElements>
-    <a:clrScheme name="Theme69">
+    <a:clrScheme name="Theme97">
       <a:dk1>
         <a:sysClr val="windowText" lastClr="000000"/>
       </a:dk1>
@@ -384,7 +384,7 @@
         <a:srgbClr val="800080"/>
       </a:folHlink>
     </a:clrScheme>
-    <a:fontScheme name="Theme69">
+    <a:fontScheme name="Theme97">
       <a:majorFont>
         <a:latin typeface="Calibri"/>
         <a:ea typeface=""/>
@@ -454,7 +454,7 @@
         <a:font script="Uigh" typeface="Microsoft Uighur"/>
       </a:minorFont>
     </a:fontScheme>
-    <a:fmtScheme name="Theme69">
+    <a:fmtScheme name="Theme97">
       <a:fillStyleLst>
         <a:solidFill>
           <a:schemeClr val="phClr"/>

</xml_diff>